<commit_message>
First slides draft finished
</commit_message>
<xml_diff>
--- a/Docs/Wiseman Final Project Presentation.pptx
+++ b/Docs/Wiseman Final Project Presentation.pptx
@@ -5,7 +5,7 @@
     <p:sldMasterId id="2147483660" r:id="rId1"/>
   </p:sldMasterIdLst>
   <p:notesMasterIdLst>
-    <p:notesMasterId r:id="rId48"/>
+    <p:notesMasterId r:id="rId56"/>
   </p:notesMasterIdLst>
   <p:sldIdLst>
     <p:sldId id="256" r:id="rId2"/>
@@ -54,28 +54,36 @@
     <p:sldId id="364" r:id="rId45"/>
     <p:sldId id="365" r:id="rId46"/>
     <p:sldId id="323" r:id="rId47"/>
+    <p:sldId id="370" r:id="rId48"/>
+    <p:sldId id="371" r:id="rId49"/>
+    <p:sldId id="366" r:id="rId50"/>
+    <p:sldId id="367" r:id="rId51"/>
+    <p:sldId id="368" r:id="rId52"/>
+    <p:sldId id="369" r:id="rId53"/>
+    <p:sldId id="372" r:id="rId54"/>
+    <p:sldId id="373" r:id="rId55"/>
   </p:sldIdLst>
   <p:sldSz cx="9144000" cy="5143500" type="screen16x9"/>
   <p:notesSz cx="6858000" cy="9144000"/>
   <p:embeddedFontLst>
     <p:embeddedFont>
       <p:font typeface="Montserrat" panose="020B0604020202020204" charset="0"/>
-      <p:regular r:id="rId49"/>
-      <p:bold r:id="rId50"/>
-      <p:italic r:id="rId51"/>
-      <p:boldItalic r:id="rId52"/>
+      <p:regular r:id="rId57"/>
+      <p:bold r:id="rId58"/>
+      <p:italic r:id="rId59"/>
+      <p:boldItalic r:id="rId60"/>
     </p:embeddedFont>
     <p:embeddedFont>
       <p:font typeface="Montserrat ExtraBold" panose="020B0604020202020204" charset="0"/>
-      <p:bold r:id="rId53"/>
-      <p:boldItalic r:id="rId54"/>
+      <p:bold r:id="rId61"/>
+      <p:boldItalic r:id="rId62"/>
     </p:embeddedFont>
     <p:embeddedFont>
       <p:font typeface="Montserrat Light" panose="020B0604020202020204" charset="0"/>
-      <p:regular r:id="rId55"/>
-      <p:bold r:id="rId56"/>
-      <p:italic r:id="rId57"/>
-      <p:boldItalic r:id="rId58"/>
+      <p:regular r:id="rId63"/>
+      <p:bold r:id="rId64"/>
+      <p:italic r:id="rId65"/>
+      <p:boldItalic r:id="rId66"/>
     </p:embeddedFont>
   </p:embeddedFontLst>
   <p:defaultTextStyle>
@@ -22849,10 +22857,10 @@
         </p:nvGrpSpPr>
         <p:grpSpPr>
           <a:xfrm>
-            <a:off x="38516" y="2689531"/>
-            <a:ext cx="3986212" cy="2279868"/>
-            <a:chOff x="314326" y="1857375"/>
-            <a:chExt cx="3986212" cy="2279868"/>
+            <a:off x="49432" y="2575258"/>
+            <a:ext cx="3986212" cy="2394141"/>
+            <a:chOff x="325242" y="1743102"/>
+            <a:chExt cx="3986212" cy="2394141"/>
           </a:xfrm>
         </p:grpSpPr>
         <p:pic>
@@ -22877,7 +22885,7 @@
           </p:blipFill>
           <p:spPr>
             <a:xfrm>
-              <a:off x="314326" y="1857375"/>
+              <a:off x="325242" y="1743102"/>
               <a:ext cx="3986212" cy="2125980"/>
             </a:xfrm>
             <a:prstGeom prst="rect">
@@ -22936,10 +22944,10 @@
         </p:nvGrpSpPr>
         <p:grpSpPr>
           <a:xfrm>
-            <a:off x="4658408" y="2689532"/>
-            <a:ext cx="4221957" cy="2279867"/>
-            <a:chOff x="4843464" y="1857375"/>
-            <a:chExt cx="4221957" cy="2279867"/>
+            <a:off x="4726367" y="2498314"/>
+            <a:ext cx="4135935" cy="2405425"/>
+            <a:chOff x="4929486" y="1857375"/>
+            <a:chExt cx="4135935" cy="2405425"/>
           </a:xfrm>
         </p:grpSpPr>
         <p:pic>
@@ -22986,7 +22994,7 @@
           </p:nvSpPr>
           <p:spPr>
             <a:xfrm>
-              <a:off x="4843464" y="3829465"/>
+              <a:off x="4929486" y="3955023"/>
               <a:ext cx="2700337" cy="307777"/>
             </a:xfrm>
             <a:prstGeom prst="rect">
@@ -26608,6 +26616,451 @@
 </p:sld>
 </file>
 
+<file path=ppt/slides/slide47.xml><?xml version="1.0" encoding="utf-8"?>
+<p:sld xmlns:a="http://schemas.openxmlformats.org/drawingml/2006/main" xmlns:r="http://schemas.openxmlformats.org/officeDocument/2006/relationships" xmlns:p="http://schemas.openxmlformats.org/presentationml/2006/main">
+  <p:cSld>
+    <p:spTree>
+      <p:nvGrpSpPr>
+        <p:cNvPr id="1" name=""/>
+        <p:cNvGrpSpPr/>
+        <p:nvPr/>
+      </p:nvGrpSpPr>
+      <p:grpSpPr>
+        <a:xfrm>
+          <a:off x="0" y="0"/>
+          <a:ext cx="0" cy="0"/>
+          <a:chOff x="0" y="0"/>
+          <a:chExt cx="0" cy="0"/>
+        </a:xfrm>
+      </p:grpSpPr>
+      <p:sp>
+        <p:nvSpPr>
+          <p:cNvPr id="2" name="Title 1">
+            <a:extLst>
+              <a:ext uri="{FF2B5EF4-FFF2-40B4-BE49-F238E27FC236}">
+                <a16:creationId xmlns:a16="http://schemas.microsoft.com/office/drawing/2014/main" id="{D640F9EA-D1B7-4675-ADAB-13A2C0356BD7}"/>
+              </a:ext>
+            </a:extLst>
+          </p:cNvPr>
+          <p:cNvSpPr>
+            <a:spLocks noGrp="1"/>
+          </p:cNvSpPr>
+          <p:nvPr>
+            <p:ph type="title"/>
+          </p:nvPr>
+        </p:nvSpPr>
+        <p:spPr/>
+        <p:txBody>
+          <a:bodyPr/>
+          <a:lstStyle/>
+          <a:p>
+            <a:pPr algn="ctr"/>
+            <a:r>
+              <a:rPr lang="en-US" dirty="0"/>
+              <a:t>Summary</a:t>
+            </a:r>
+          </a:p>
+        </p:txBody>
+      </p:sp>
+      <p:sp>
+        <p:nvSpPr>
+          <p:cNvPr id="3" name="Text Placeholder 2">
+            <a:extLst>
+              <a:ext uri="{FF2B5EF4-FFF2-40B4-BE49-F238E27FC236}">
+                <a16:creationId xmlns:a16="http://schemas.microsoft.com/office/drawing/2014/main" id="{D6553B36-A500-406A-9AE0-AA251948D3E0}"/>
+              </a:ext>
+            </a:extLst>
+          </p:cNvPr>
+          <p:cNvSpPr>
+            <a:spLocks noGrp="1"/>
+          </p:cNvSpPr>
+          <p:nvPr>
+            <p:ph type="body" idx="1"/>
+          </p:nvPr>
+        </p:nvSpPr>
+        <p:spPr/>
+        <p:txBody>
+          <a:bodyPr/>
+          <a:lstStyle/>
+          <a:p>
+            <a:r>
+              <a:rPr lang="en-US" dirty="0"/>
+              <a:t>Document clustering is an interesting area with diverse applications</a:t>
+            </a:r>
+          </a:p>
+          <a:p>
+            <a:r>
+              <a:rPr lang="en-US" dirty="0"/>
+              <a:t>Interaction of multiple parts: data collection, language cleaning, model creation (and neural network training)</a:t>
+            </a:r>
+          </a:p>
+          <a:p>
+            <a:r>
+              <a:rPr lang="en-US" dirty="0"/>
+              <a:t>Need a complete understanding of each part in order to create accurate representations of documents</a:t>
+            </a:r>
+          </a:p>
+        </p:txBody>
+      </p:sp>
+      <p:sp>
+        <p:nvSpPr>
+          <p:cNvPr id="4" name="Slide Number Placeholder 3">
+            <a:extLst>
+              <a:ext uri="{FF2B5EF4-FFF2-40B4-BE49-F238E27FC236}">
+                <a16:creationId xmlns:a16="http://schemas.microsoft.com/office/drawing/2014/main" id="{8D839689-4822-41FD-B74D-EF1D37E093CC}"/>
+              </a:ext>
+            </a:extLst>
+          </p:cNvPr>
+          <p:cNvSpPr>
+            <a:spLocks noGrp="1"/>
+          </p:cNvSpPr>
+          <p:nvPr>
+            <p:ph type="sldNum" idx="12"/>
+          </p:nvPr>
+        </p:nvSpPr>
+        <p:spPr/>
+        <p:txBody>
+          <a:bodyPr/>
+          <a:lstStyle/>
+          <a:p>
+            <a:pPr marL="0" lvl="0" indent="0" algn="r" rtl="0">
+              <a:spcBef>
+                <a:spcPts val="0"/>
+              </a:spcBef>
+              <a:spcAft>
+                <a:spcPts val="0"/>
+              </a:spcAft>
+              <a:buNone/>
+            </a:pPr>
+            <a:fld id="{00000000-1234-1234-1234-123412341234}" type="slidenum">
+              <a:rPr lang="en" smtClean="0"/>
+              <a:t>47</a:t>
+            </a:fld>
+            <a:endParaRPr lang="en"/>
+          </a:p>
+        </p:txBody>
+      </p:sp>
+    </p:spTree>
+    <p:extLst>
+      <p:ext uri="{BB962C8B-B14F-4D97-AF65-F5344CB8AC3E}">
+        <p14:creationId xmlns:p14="http://schemas.microsoft.com/office/powerpoint/2010/main" val="321508251"/>
+      </p:ext>
+    </p:extLst>
+  </p:cSld>
+  <p:clrMapOvr>
+    <a:masterClrMapping/>
+  </p:clrMapOvr>
+</p:sld>
+</file>
+
+<file path=ppt/slides/slide48.xml><?xml version="1.0" encoding="utf-8"?>
+<p:sld xmlns:a="http://schemas.openxmlformats.org/drawingml/2006/main" xmlns:r="http://schemas.openxmlformats.org/officeDocument/2006/relationships" xmlns:p="http://schemas.openxmlformats.org/presentationml/2006/main">
+  <p:cSld>
+    <p:spTree>
+      <p:nvGrpSpPr>
+        <p:cNvPr id="1" name=""/>
+        <p:cNvGrpSpPr/>
+        <p:nvPr/>
+      </p:nvGrpSpPr>
+      <p:grpSpPr>
+        <a:xfrm>
+          <a:off x="0" y="0"/>
+          <a:ext cx="0" cy="0"/>
+          <a:chOff x="0" y="0"/>
+          <a:chExt cx="0" cy="0"/>
+        </a:xfrm>
+      </p:grpSpPr>
+      <p:sp>
+        <p:nvSpPr>
+          <p:cNvPr id="2" name="Title 1">
+            <a:extLst>
+              <a:ext uri="{FF2B5EF4-FFF2-40B4-BE49-F238E27FC236}">
+                <a16:creationId xmlns:a16="http://schemas.microsoft.com/office/drawing/2014/main" id="{21F15434-0ABF-45F1-8FCE-EDA9E9FC0FA2}"/>
+              </a:ext>
+            </a:extLst>
+          </p:cNvPr>
+          <p:cNvSpPr>
+            <a:spLocks noGrp="1"/>
+          </p:cNvSpPr>
+          <p:nvPr>
+            <p:ph type="title"/>
+          </p:nvPr>
+        </p:nvSpPr>
+        <p:spPr/>
+        <p:txBody>
+          <a:bodyPr/>
+          <a:lstStyle/>
+          <a:p>
+            <a:pPr algn="ctr"/>
+            <a:r>
+              <a:rPr lang="en-US" dirty="0"/>
+              <a:t>Project Results</a:t>
+            </a:r>
+          </a:p>
+        </p:txBody>
+      </p:sp>
+      <p:sp>
+        <p:nvSpPr>
+          <p:cNvPr id="3" name="Text Placeholder 2">
+            <a:extLst>
+              <a:ext uri="{FF2B5EF4-FFF2-40B4-BE49-F238E27FC236}">
+                <a16:creationId xmlns:a16="http://schemas.microsoft.com/office/drawing/2014/main" id="{3F7F4AC1-091C-4FF0-80D1-38AA33B1BB24}"/>
+              </a:ext>
+            </a:extLst>
+          </p:cNvPr>
+          <p:cNvSpPr>
+            <a:spLocks noGrp="1"/>
+          </p:cNvSpPr>
+          <p:nvPr>
+            <p:ph type="body" idx="1"/>
+          </p:nvPr>
+        </p:nvSpPr>
+        <p:spPr/>
+        <p:txBody>
+          <a:bodyPr/>
+          <a:lstStyle/>
+          <a:p>
+            <a:r>
+              <a:rPr lang="en-US" sz="2000" dirty="0"/>
+              <a:t>Were able to produce a rudimentary recommendation system using document clustering</a:t>
+            </a:r>
+          </a:p>
+          <a:p>
+            <a:r>
+              <a:rPr lang="en-US" sz="2000" dirty="0"/>
+              <a:t>Also able to visualize subreddits’ relationships</a:t>
+            </a:r>
+          </a:p>
+          <a:p>
+            <a:r>
+              <a:rPr lang="en-US" sz="2000" dirty="0"/>
+              <a:t>Varying cluster sizes: small to large</a:t>
+            </a:r>
+          </a:p>
+          <a:p>
+            <a:r>
+              <a:rPr lang="en-US" sz="2000" dirty="0"/>
+              <a:t>Always had overlapping clusters: need larger dataset to bring out differences between subreddits</a:t>
+            </a:r>
+          </a:p>
+          <a:p>
+            <a:r>
+              <a:rPr lang="en-US" sz="2000" dirty="0"/>
+              <a:t>TF-IDF model actually had better results, but is limited due to size</a:t>
+            </a:r>
+          </a:p>
+          <a:p>
+            <a:endParaRPr lang="en-US" sz="2000" dirty="0"/>
+          </a:p>
+        </p:txBody>
+      </p:sp>
+      <p:sp>
+        <p:nvSpPr>
+          <p:cNvPr id="4" name="Slide Number Placeholder 3">
+            <a:extLst>
+              <a:ext uri="{FF2B5EF4-FFF2-40B4-BE49-F238E27FC236}">
+                <a16:creationId xmlns:a16="http://schemas.microsoft.com/office/drawing/2014/main" id="{52F3B475-1176-4B64-B854-E8C4EF5F5BCE}"/>
+              </a:ext>
+            </a:extLst>
+          </p:cNvPr>
+          <p:cNvSpPr>
+            <a:spLocks noGrp="1"/>
+          </p:cNvSpPr>
+          <p:nvPr>
+            <p:ph type="sldNum" idx="12"/>
+          </p:nvPr>
+        </p:nvSpPr>
+        <p:spPr/>
+        <p:txBody>
+          <a:bodyPr/>
+          <a:lstStyle/>
+          <a:p>
+            <a:pPr marL="0" lvl="0" indent="0" algn="r" rtl="0">
+              <a:spcBef>
+                <a:spcPts val="0"/>
+              </a:spcBef>
+              <a:spcAft>
+                <a:spcPts val="0"/>
+              </a:spcAft>
+              <a:buNone/>
+            </a:pPr>
+            <a:fld id="{00000000-1234-1234-1234-123412341234}" type="slidenum">
+              <a:rPr lang="en" smtClean="0"/>
+              <a:t>48</a:t>
+            </a:fld>
+            <a:endParaRPr lang="en"/>
+          </a:p>
+        </p:txBody>
+      </p:sp>
+    </p:spTree>
+    <p:extLst>
+      <p:ext uri="{BB962C8B-B14F-4D97-AF65-F5344CB8AC3E}">
+        <p14:creationId xmlns:p14="http://schemas.microsoft.com/office/powerpoint/2010/main" val="1209202647"/>
+      </p:ext>
+    </p:extLst>
+  </p:cSld>
+  <p:clrMapOvr>
+    <a:masterClrMapping/>
+  </p:clrMapOvr>
+</p:sld>
+</file>
+
+<file path=ppt/slides/slide49.xml><?xml version="1.0" encoding="utf-8"?>
+<p:sld xmlns:a="http://schemas.openxmlformats.org/drawingml/2006/main" xmlns:r="http://schemas.openxmlformats.org/officeDocument/2006/relationships" xmlns:p="http://schemas.openxmlformats.org/presentationml/2006/main">
+  <p:cSld>
+    <p:spTree>
+      <p:nvGrpSpPr>
+        <p:cNvPr id="1" name=""/>
+        <p:cNvGrpSpPr/>
+        <p:nvPr/>
+      </p:nvGrpSpPr>
+      <p:grpSpPr>
+        <a:xfrm>
+          <a:off x="0" y="0"/>
+          <a:ext cx="0" cy="0"/>
+          <a:chOff x="0" y="0"/>
+          <a:chExt cx="0" cy="0"/>
+        </a:xfrm>
+      </p:grpSpPr>
+      <p:sp>
+        <p:nvSpPr>
+          <p:cNvPr id="2" name="Title 1">
+            <a:extLst>
+              <a:ext uri="{FF2B5EF4-FFF2-40B4-BE49-F238E27FC236}">
+                <a16:creationId xmlns:a16="http://schemas.microsoft.com/office/drawing/2014/main" id="{BEE054F2-8A16-4F93-9EFC-1476EDCA768D}"/>
+              </a:ext>
+            </a:extLst>
+          </p:cNvPr>
+          <p:cNvSpPr>
+            <a:spLocks noGrp="1"/>
+          </p:cNvSpPr>
+          <p:nvPr>
+            <p:ph type="title"/>
+          </p:nvPr>
+        </p:nvSpPr>
+        <p:spPr/>
+        <p:txBody>
+          <a:bodyPr/>
+          <a:lstStyle/>
+          <a:p>
+            <a:pPr algn="ctr"/>
+            <a:r>
+              <a:rPr lang="en-US" dirty="0"/>
+              <a:t>Dataset Improvements</a:t>
+            </a:r>
+          </a:p>
+        </p:txBody>
+      </p:sp>
+      <p:sp>
+        <p:nvSpPr>
+          <p:cNvPr id="3" name="Text Placeholder 2">
+            <a:extLst>
+              <a:ext uri="{FF2B5EF4-FFF2-40B4-BE49-F238E27FC236}">
+                <a16:creationId xmlns:a16="http://schemas.microsoft.com/office/drawing/2014/main" id="{B880D763-9E66-499D-93AC-58C825473526}"/>
+              </a:ext>
+            </a:extLst>
+          </p:cNvPr>
+          <p:cNvSpPr>
+            <a:spLocks noGrp="1"/>
+          </p:cNvSpPr>
+          <p:nvPr>
+            <p:ph type="body" idx="1"/>
+          </p:nvPr>
+        </p:nvSpPr>
+        <p:spPr>
+          <a:xfrm>
+            <a:off x="1320025" y="1374475"/>
+            <a:ext cx="6455700" cy="2902500"/>
+          </a:xfrm>
+        </p:spPr>
+        <p:txBody>
+          <a:bodyPr/>
+          <a:lstStyle/>
+          <a:p>
+            <a:r>
+              <a:rPr lang="en-US" dirty="0"/>
+              <a:t>To really bring out the differences in text, we should collect a bigger dataset</a:t>
+            </a:r>
+          </a:p>
+          <a:p>
+            <a:r>
+              <a:rPr lang="en-US" dirty="0"/>
+              <a:t>But scraping is expensive: API requests are limited, it’s hard to access posts, and there are a lot of cleaning steps</a:t>
+            </a:r>
+          </a:p>
+          <a:p>
+            <a:r>
+              <a:rPr lang="en-US" dirty="0"/>
+              <a:t>Which posts should we collect?</a:t>
+            </a:r>
+          </a:p>
+          <a:p>
+            <a:pPr lvl="1"/>
+            <a:r>
+              <a:rPr lang="en-US" dirty="0"/>
+              <a:t>Top posts of all time tend to be highly focused on big events/news stories</a:t>
+            </a:r>
+          </a:p>
+          <a:p>
+            <a:pPr lvl="1"/>
+            <a:r>
+              <a:rPr lang="en-US" dirty="0"/>
+              <a:t>Not every post has enough comments to really contribute</a:t>
+            </a:r>
+          </a:p>
+        </p:txBody>
+      </p:sp>
+      <p:sp>
+        <p:nvSpPr>
+          <p:cNvPr id="4" name="Slide Number Placeholder 3">
+            <a:extLst>
+              <a:ext uri="{FF2B5EF4-FFF2-40B4-BE49-F238E27FC236}">
+                <a16:creationId xmlns:a16="http://schemas.microsoft.com/office/drawing/2014/main" id="{801B38F7-7A68-4FC9-91D5-3954627ACCE4}"/>
+              </a:ext>
+            </a:extLst>
+          </p:cNvPr>
+          <p:cNvSpPr>
+            <a:spLocks noGrp="1"/>
+          </p:cNvSpPr>
+          <p:nvPr>
+            <p:ph type="sldNum" idx="12"/>
+          </p:nvPr>
+        </p:nvSpPr>
+        <p:spPr/>
+        <p:txBody>
+          <a:bodyPr/>
+          <a:lstStyle/>
+          <a:p>
+            <a:pPr marL="0" lvl="0" indent="0" algn="r" rtl="0">
+              <a:spcBef>
+                <a:spcPts val="0"/>
+              </a:spcBef>
+              <a:spcAft>
+                <a:spcPts val="0"/>
+              </a:spcAft>
+              <a:buNone/>
+            </a:pPr>
+            <a:fld id="{00000000-1234-1234-1234-123412341234}" type="slidenum">
+              <a:rPr lang="en" smtClean="0"/>
+              <a:t>49</a:t>
+            </a:fld>
+            <a:endParaRPr lang="en"/>
+          </a:p>
+        </p:txBody>
+      </p:sp>
+    </p:spTree>
+    <p:extLst>
+      <p:ext uri="{BB962C8B-B14F-4D97-AF65-F5344CB8AC3E}">
+        <p14:creationId xmlns:p14="http://schemas.microsoft.com/office/powerpoint/2010/main" val="1272165154"/>
+      </p:ext>
+    </p:extLst>
+  </p:cSld>
+  <p:clrMapOvr>
+    <a:masterClrMapping/>
+  </p:clrMapOvr>
+</p:sld>
+</file>
+
 <file path=ppt/slides/slide5.xml><?xml version="1.0" encoding="utf-8"?>
 <p:sld xmlns:a="http://schemas.openxmlformats.org/drawingml/2006/main" xmlns:r="http://schemas.openxmlformats.org/officeDocument/2006/relationships" xmlns:p="http://schemas.openxmlformats.org/presentationml/2006/main">
   <p:cSld>
@@ -26739,6 +27192,703 @@
     <p:extLst>
       <p:ext uri="{BB962C8B-B14F-4D97-AF65-F5344CB8AC3E}">
         <p14:creationId xmlns:p14="http://schemas.microsoft.com/office/powerpoint/2010/main" val="742009486"/>
+      </p:ext>
+    </p:extLst>
+  </p:cSld>
+  <p:clrMapOvr>
+    <a:masterClrMapping/>
+  </p:clrMapOvr>
+</p:sld>
+</file>
+
+<file path=ppt/slides/slide50.xml><?xml version="1.0" encoding="utf-8"?>
+<p:sld xmlns:a="http://schemas.openxmlformats.org/drawingml/2006/main" xmlns:r="http://schemas.openxmlformats.org/officeDocument/2006/relationships" xmlns:p="http://schemas.openxmlformats.org/presentationml/2006/main">
+  <p:cSld>
+    <p:spTree>
+      <p:nvGrpSpPr>
+        <p:cNvPr id="1" name=""/>
+        <p:cNvGrpSpPr/>
+        <p:nvPr/>
+      </p:nvGrpSpPr>
+      <p:grpSpPr>
+        <a:xfrm>
+          <a:off x="0" y="0"/>
+          <a:ext cx="0" cy="0"/>
+          <a:chOff x="0" y="0"/>
+          <a:chExt cx="0" cy="0"/>
+        </a:xfrm>
+      </p:grpSpPr>
+      <p:sp>
+        <p:nvSpPr>
+          <p:cNvPr id="2" name="Title 1">
+            <a:extLst>
+              <a:ext uri="{FF2B5EF4-FFF2-40B4-BE49-F238E27FC236}">
+                <a16:creationId xmlns:a16="http://schemas.microsoft.com/office/drawing/2014/main" id="{C0967A92-9EE8-4ABA-96E1-F27FFAAA2BC6}"/>
+              </a:ext>
+            </a:extLst>
+          </p:cNvPr>
+          <p:cNvSpPr>
+            <a:spLocks noGrp="1"/>
+          </p:cNvSpPr>
+          <p:nvPr>
+            <p:ph type="title"/>
+          </p:nvPr>
+        </p:nvSpPr>
+        <p:spPr/>
+        <p:txBody>
+          <a:bodyPr/>
+          <a:lstStyle/>
+          <a:p>
+            <a:pPr algn="ctr"/>
+            <a:r>
+              <a:rPr lang="en-US" dirty="0"/>
+              <a:t>Dataset Improvements (cont.)</a:t>
+            </a:r>
+          </a:p>
+        </p:txBody>
+      </p:sp>
+      <p:sp>
+        <p:nvSpPr>
+          <p:cNvPr id="3" name="Text Placeholder 2">
+            <a:extLst>
+              <a:ext uri="{FF2B5EF4-FFF2-40B4-BE49-F238E27FC236}">
+                <a16:creationId xmlns:a16="http://schemas.microsoft.com/office/drawing/2014/main" id="{92AAED0A-7E62-49E6-B504-25C2590E000E}"/>
+              </a:ext>
+            </a:extLst>
+          </p:cNvPr>
+          <p:cNvSpPr>
+            <a:spLocks noGrp="1"/>
+          </p:cNvSpPr>
+          <p:nvPr>
+            <p:ph type="body" idx="1"/>
+          </p:nvPr>
+        </p:nvSpPr>
+        <p:spPr/>
+        <p:txBody>
+          <a:bodyPr/>
+          <a:lstStyle/>
+          <a:p>
+            <a:r>
+              <a:rPr lang="en-US" dirty="0"/>
+              <a:t>Which subreddits to collect?</a:t>
+            </a:r>
+          </a:p>
+          <a:p>
+            <a:pPr lvl="1"/>
+            <a:r>
+              <a:rPr lang="en-US" dirty="0"/>
+              <a:t>Only the most active ones?</a:t>
+            </a:r>
+          </a:p>
+          <a:p>
+            <a:pPr lvl="1"/>
+            <a:r>
+              <a:rPr lang="en-US" dirty="0"/>
+              <a:t>Putting a threshold on the minimum number of comments in order to be clustered</a:t>
+            </a:r>
+          </a:p>
+          <a:p>
+            <a:r>
+              <a:rPr lang="en-US" dirty="0"/>
+              <a:t>Sampling to get more representative comments</a:t>
+            </a:r>
+          </a:p>
+          <a:p>
+            <a:r>
+              <a:rPr lang="en-US" dirty="0"/>
+              <a:t>Size becomes an issue (like in next slide)</a:t>
+            </a:r>
+          </a:p>
+          <a:p>
+            <a:pPr lvl="1"/>
+            <a:endParaRPr lang="en-US" dirty="0"/>
+          </a:p>
+        </p:txBody>
+      </p:sp>
+      <p:sp>
+        <p:nvSpPr>
+          <p:cNvPr id="4" name="Slide Number Placeholder 3">
+            <a:extLst>
+              <a:ext uri="{FF2B5EF4-FFF2-40B4-BE49-F238E27FC236}">
+                <a16:creationId xmlns:a16="http://schemas.microsoft.com/office/drawing/2014/main" id="{4EACFF8A-0E81-4A45-B883-6898F04FD62D}"/>
+              </a:ext>
+            </a:extLst>
+          </p:cNvPr>
+          <p:cNvSpPr>
+            <a:spLocks noGrp="1"/>
+          </p:cNvSpPr>
+          <p:nvPr>
+            <p:ph type="sldNum" idx="12"/>
+          </p:nvPr>
+        </p:nvSpPr>
+        <p:spPr/>
+        <p:txBody>
+          <a:bodyPr/>
+          <a:lstStyle/>
+          <a:p>
+            <a:pPr marL="0" lvl="0" indent="0" algn="r" rtl="0">
+              <a:spcBef>
+                <a:spcPts val="0"/>
+              </a:spcBef>
+              <a:spcAft>
+                <a:spcPts val="0"/>
+              </a:spcAft>
+              <a:buNone/>
+            </a:pPr>
+            <a:fld id="{00000000-1234-1234-1234-123412341234}" type="slidenum">
+              <a:rPr lang="en" smtClean="0"/>
+              <a:t>50</a:t>
+            </a:fld>
+            <a:endParaRPr lang="en"/>
+          </a:p>
+        </p:txBody>
+      </p:sp>
+    </p:spTree>
+    <p:extLst>
+      <p:ext uri="{BB962C8B-B14F-4D97-AF65-F5344CB8AC3E}">
+        <p14:creationId xmlns:p14="http://schemas.microsoft.com/office/powerpoint/2010/main" val="2861126683"/>
+      </p:ext>
+    </p:extLst>
+  </p:cSld>
+  <p:clrMapOvr>
+    <a:masterClrMapping/>
+  </p:clrMapOvr>
+</p:sld>
+</file>
+
+<file path=ppt/slides/slide51.xml><?xml version="1.0" encoding="utf-8"?>
+<p:sld xmlns:a="http://schemas.openxmlformats.org/drawingml/2006/main" xmlns:r="http://schemas.openxmlformats.org/officeDocument/2006/relationships" xmlns:p="http://schemas.openxmlformats.org/presentationml/2006/main">
+  <p:cSld>
+    <p:spTree>
+      <p:nvGrpSpPr>
+        <p:cNvPr id="1" name=""/>
+        <p:cNvGrpSpPr/>
+        <p:nvPr/>
+      </p:nvGrpSpPr>
+      <p:grpSpPr>
+        <a:xfrm>
+          <a:off x="0" y="0"/>
+          <a:ext cx="0" cy="0"/>
+          <a:chOff x="0" y="0"/>
+          <a:chExt cx="0" cy="0"/>
+        </a:xfrm>
+      </p:grpSpPr>
+      <p:sp>
+        <p:nvSpPr>
+          <p:cNvPr id="2" name="Title 1">
+            <a:extLst>
+              <a:ext uri="{FF2B5EF4-FFF2-40B4-BE49-F238E27FC236}">
+                <a16:creationId xmlns:a16="http://schemas.microsoft.com/office/drawing/2014/main" id="{4D67CC82-FBF3-443A-97DB-097C2E755F6A}"/>
+              </a:ext>
+            </a:extLst>
+          </p:cNvPr>
+          <p:cNvSpPr>
+            <a:spLocks noGrp="1"/>
+          </p:cNvSpPr>
+          <p:nvPr>
+            <p:ph type="title"/>
+          </p:nvPr>
+        </p:nvSpPr>
+        <p:spPr/>
+        <p:txBody>
+          <a:bodyPr/>
+          <a:lstStyle/>
+          <a:p>
+            <a:pPr algn="ctr"/>
+            <a:r>
+              <a:rPr lang="en-US" dirty="0"/>
+              <a:t>A potential dataset</a:t>
+            </a:r>
+          </a:p>
+        </p:txBody>
+      </p:sp>
+      <p:sp>
+        <p:nvSpPr>
+          <p:cNvPr id="3" name="Text Placeholder 2">
+            <a:extLst>
+              <a:ext uri="{FF2B5EF4-FFF2-40B4-BE49-F238E27FC236}">
+                <a16:creationId xmlns:a16="http://schemas.microsoft.com/office/drawing/2014/main" id="{A1C04ECF-BAA3-4283-8360-F32B2451C171}"/>
+              </a:ext>
+            </a:extLst>
+          </p:cNvPr>
+          <p:cNvSpPr>
+            <a:spLocks noGrp="1"/>
+          </p:cNvSpPr>
+          <p:nvPr>
+            <p:ph type="body" idx="1"/>
+          </p:nvPr>
+        </p:nvSpPr>
+        <p:spPr/>
+        <p:txBody>
+          <a:bodyPr/>
+          <a:lstStyle/>
+          <a:p>
+            <a:r>
+              <a:rPr lang="en-US" dirty="0">
+                <a:hlinkClick r:id="rId2"/>
+              </a:rPr>
+              <a:t>https://www.kaggle.com/reddit/reddit-comments-may-2015</a:t>
+            </a:r>
+            <a:endParaRPr lang="en-US" dirty="0"/>
+          </a:p>
+          <a:p>
+            <a:r>
+              <a:rPr lang="en-US" dirty="0"/>
+              <a:t>All comments on Reddit in May 2015, scraped using a similar process</a:t>
+            </a:r>
+          </a:p>
+          <a:p>
+            <a:r>
+              <a:rPr lang="en-US" dirty="0"/>
+              <a:t>Stored in an SQLite file</a:t>
+            </a:r>
+          </a:p>
+          <a:p>
+            <a:r>
+              <a:rPr lang="en-US" dirty="0"/>
+              <a:t>~20 GB compressed, ~40 GB to use</a:t>
+            </a:r>
+          </a:p>
+          <a:p>
+            <a:r>
+              <a:rPr lang="en-US" dirty="0"/>
+              <a:t>Size and access issues</a:t>
+            </a:r>
+          </a:p>
+        </p:txBody>
+      </p:sp>
+      <p:sp>
+        <p:nvSpPr>
+          <p:cNvPr id="4" name="Slide Number Placeholder 3">
+            <a:extLst>
+              <a:ext uri="{FF2B5EF4-FFF2-40B4-BE49-F238E27FC236}">
+                <a16:creationId xmlns:a16="http://schemas.microsoft.com/office/drawing/2014/main" id="{D4EB53F6-9C13-4DD8-BC67-CBE473EF28D9}"/>
+              </a:ext>
+            </a:extLst>
+          </p:cNvPr>
+          <p:cNvSpPr>
+            <a:spLocks noGrp="1"/>
+          </p:cNvSpPr>
+          <p:nvPr>
+            <p:ph type="sldNum" idx="12"/>
+          </p:nvPr>
+        </p:nvSpPr>
+        <p:spPr/>
+        <p:txBody>
+          <a:bodyPr/>
+          <a:lstStyle/>
+          <a:p>
+            <a:pPr marL="0" lvl="0" indent="0" algn="r" rtl="0">
+              <a:spcBef>
+                <a:spcPts val="0"/>
+              </a:spcBef>
+              <a:spcAft>
+                <a:spcPts val="0"/>
+              </a:spcAft>
+              <a:buNone/>
+            </a:pPr>
+            <a:fld id="{00000000-1234-1234-1234-123412341234}" type="slidenum">
+              <a:rPr lang="en" smtClean="0"/>
+              <a:t>51</a:t>
+            </a:fld>
+            <a:endParaRPr lang="en"/>
+          </a:p>
+        </p:txBody>
+      </p:sp>
+    </p:spTree>
+    <p:extLst>
+      <p:ext uri="{BB962C8B-B14F-4D97-AF65-F5344CB8AC3E}">
+        <p14:creationId xmlns:p14="http://schemas.microsoft.com/office/powerpoint/2010/main" val="2878223714"/>
+      </p:ext>
+    </p:extLst>
+  </p:cSld>
+  <p:clrMapOvr>
+    <a:masterClrMapping/>
+  </p:clrMapOvr>
+</p:sld>
+</file>
+
+<file path=ppt/slides/slide52.xml><?xml version="1.0" encoding="utf-8"?>
+<p:sld xmlns:a="http://schemas.openxmlformats.org/drawingml/2006/main" xmlns:r="http://schemas.openxmlformats.org/officeDocument/2006/relationships" xmlns:p="http://schemas.openxmlformats.org/presentationml/2006/main">
+  <p:cSld>
+    <p:spTree>
+      <p:nvGrpSpPr>
+        <p:cNvPr id="1" name=""/>
+        <p:cNvGrpSpPr/>
+        <p:nvPr/>
+      </p:nvGrpSpPr>
+      <p:grpSpPr>
+        <a:xfrm>
+          <a:off x="0" y="0"/>
+          <a:ext cx="0" cy="0"/>
+          <a:chOff x="0" y="0"/>
+          <a:chExt cx="0" cy="0"/>
+        </a:xfrm>
+      </p:grpSpPr>
+      <p:sp>
+        <p:nvSpPr>
+          <p:cNvPr id="2" name="Title 1">
+            <a:extLst>
+              <a:ext uri="{FF2B5EF4-FFF2-40B4-BE49-F238E27FC236}">
+                <a16:creationId xmlns:a16="http://schemas.microsoft.com/office/drawing/2014/main" id="{544E5FFB-C1FA-429C-BFC0-82C84245BECD}"/>
+              </a:ext>
+            </a:extLst>
+          </p:cNvPr>
+          <p:cNvSpPr>
+            <a:spLocks noGrp="1"/>
+          </p:cNvSpPr>
+          <p:nvPr>
+            <p:ph type="title"/>
+          </p:nvPr>
+        </p:nvSpPr>
+        <p:spPr/>
+        <p:txBody>
+          <a:bodyPr/>
+          <a:lstStyle/>
+          <a:p>
+            <a:pPr algn="ctr"/>
+            <a:r>
+              <a:rPr lang="en-US" dirty="0"/>
+              <a:t>Method Improvements</a:t>
+            </a:r>
+          </a:p>
+        </p:txBody>
+      </p:sp>
+      <p:sp>
+        <p:nvSpPr>
+          <p:cNvPr id="3" name="Text Placeholder 2">
+            <a:extLst>
+              <a:ext uri="{FF2B5EF4-FFF2-40B4-BE49-F238E27FC236}">
+                <a16:creationId xmlns:a16="http://schemas.microsoft.com/office/drawing/2014/main" id="{EBADA59E-D7D9-47B5-AC8F-6A5B9BB0EAD4}"/>
+              </a:ext>
+            </a:extLst>
+          </p:cNvPr>
+          <p:cNvSpPr>
+            <a:spLocks noGrp="1"/>
+          </p:cNvSpPr>
+          <p:nvPr>
+            <p:ph type="body" idx="1"/>
+          </p:nvPr>
+        </p:nvSpPr>
+        <p:spPr/>
+        <p:txBody>
+          <a:bodyPr/>
+          <a:lstStyle/>
+          <a:p>
+            <a:r>
+              <a:rPr lang="en-US" sz="2000" dirty="0"/>
+              <a:t>Training embeddings was done very clumsily: treated as a hyperparameter for a K-Means model (without altering anything else in the model)</a:t>
+            </a:r>
+          </a:p>
+          <a:p>
+            <a:r>
+              <a:rPr lang="en-US" sz="2000" dirty="0"/>
+              <a:t>Need to do more research into the Doc2Vec algorithm and how it works</a:t>
+            </a:r>
+          </a:p>
+          <a:p>
+            <a:r>
+              <a:rPr lang="en-US" sz="2000" dirty="0"/>
+              <a:t>For TF-IDF vectorization, need a better understanding of how to perform dimensionality reduction without losing too much of data’s variance</a:t>
+            </a:r>
+          </a:p>
+        </p:txBody>
+      </p:sp>
+      <p:sp>
+        <p:nvSpPr>
+          <p:cNvPr id="4" name="Slide Number Placeholder 3">
+            <a:extLst>
+              <a:ext uri="{FF2B5EF4-FFF2-40B4-BE49-F238E27FC236}">
+                <a16:creationId xmlns:a16="http://schemas.microsoft.com/office/drawing/2014/main" id="{8614DD9F-75D7-4230-A6CC-D0A40A4382BA}"/>
+              </a:ext>
+            </a:extLst>
+          </p:cNvPr>
+          <p:cNvSpPr>
+            <a:spLocks noGrp="1"/>
+          </p:cNvSpPr>
+          <p:nvPr>
+            <p:ph type="sldNum" idx="12"/>
+          </p:nvPr>
+        </p:nvSpPr>
+        <p:spPr/>
+        <p:txBody>
+          <a:bodyPr/>
+          <a:lstStyle/>
+          <a:p>
+            <a:pPr marL="0" lvl="0" indent="0" algn="r" rtl="0">
+              <a:spcBef>
+                <a:spcPts val="0"/>
+              </a:spcBef>
+              <a:spcAft>
+                <a:spcPts val="0"/>
+              </a:spcAft>
+              <a:buNone/>
+            </a:pPr>
+            <a:fld id="{00000000-1234-1234-1234-123412341234}" type="slidenum">
+              <a:rPr lang="en" smtClean="0"/>
+              <a:t>52</a:t>
+            </a:fld>
+            <a:endParaRPr lang="en"/>
+          </a:p>
+        </p:txBody>
+      </p:sp>
+    </p:spTree>
+    <p:extLst>
+      <p:ext uri="{BB962C8B-B14F-4D97-AF65-F5344CB8AC3E}">
+        <p14:creationId xmlns:p14="http://schemas.microsoft.com/office/powerpoint/2010/main" val="845379875"/>
+      </p:ext>
+    </p:extLst>
+  </p:cSld>
+  <p:clrMapOvr>
+    <a:masterClrMapping/>
+  </p:clrMapOvr>
+</p:sld>
+</file>
+
+<file path=ppt/slides/slide53.xml><?xml version="1.0" encoding="utf-8"?>
+<p:sld xmlns:a="http://schemas.openxmlformats.org/drawingml/2006/main" xmlns:r="http://schemas.openxmlformats.org/officeDocument/2006/relationships" xmlns:p="http://schemas.openxmlformats.org/presentationml/2006/main">
+  <p:cSld>
+    <p:spTree>
+      <p:nvGrpSpPr>
+        <p:cNvPr id="1" name=""/>
+        <p:cNvGrpSpPr/>
+        <p:nvPr/>
+      </p:nvGrpSpPr>
+      <p:grpSpPr>
+        <a:xfrm>
+          <a:off x="0" y="0"/>
+          <a:ext cx="0" cy="0"/>
+          <a:chOff x="0" y="0"/>
+          <a:chExt cx="0" cy="0"/>
+        </a:xfrm>
+      </p:grpSpPr>
+      <p:sp>
+        <p:nvSpPr>
+          <p:cNvPr id="2" name="Title 1">
+            <a:extLst>
+              <a:ext uri="{FF2B5EF4-FFF2-40B4-BE49-F238E27FC236}">
+                <a16:creationId xmlns:a16="http://schemas.microsoft.com/office/drawing/2014/main" id="{B97839E7-0459-4DF2-99EA-5942BA867D0A}"/>
+              </a:ext>
+            </a:extLst>
+          </p:cNvPr>
+          <p:cNvSpPr>
+            <a:spLocks noGrp="1"/>
+          </p:cNvSpPr>
+          <p:nvPr>
+            <p:ph type="title"/>
+          </p:nvPr>
+        </p:nvSpPr>
+        <p:spPr/>
+        <p:txBody>
+          <a:bodyPr/>
+          <a:lstStyle/>
+          <a:p>
+            <a:pPr algn="ctr"/>
+            <a:r>
+              <a:rPr lang="en-US" dirty="0"/>
+              <a:t>Method Improvements (cont.)</a:t>
+            </a:r>
+          </a:p>
+        </p:txBody>
+      </p:sp>
+      <p:sp>
+        <p:nvSpPr>
+          <p:cNvPr id="3" name="Text Placeholder 2">
+            <a:extLst>
+              <a:ext uri="{FF2B5EF4-FFF2-40B4-BE49-F238E27FC236}">
+                <a16:creationId xmlns:a16="http://schemas.microsoft.com/office/drawing/2014/main" id="{BB97CC15-D3AE-4806-BD1B-16E45D737EF6}"/>
+              </a:ext>
+            </a:extLst>
+          </p:cNvPr>
+          <p:cNvSpPr>
+            <a:spLocks noGrp="1"/>
+          </p:cNvSpPr>
+          <p:nvPr>
+            <p:ph type="body" idx="1"/>
+          </p:nvPr>
+        </p:nvSpPr>
+        <p:spPr/>
+        <p:txBody>
+          <a:bodyPr/>
+          <a:lstStyle/>
+          <a:p>
+            <a:r>
+              <a:rPr lang="en-US" dirty="0"/>
+              <a:t>How to hand-label subreddits into categories</a:t>
+            </a:r>
+          </a:p>
+          <a:p>
+            <a:pPr lvl="1"/>
+            <a:r>
+              <a:rPr lang="en-US" dirty="0"/>
+              <a:t>Very subjective</a:t>
+            </a:r>
+          </a:p>
+          <a:p>
+            <a:pPr lvl="1"/>
+            <a:r>
+              <a:rPr lang="en-US" dirty="0"/>
+              <a:t>Huge influence on which subreddits are collected</a:t>
+            </a:r>
+          </a:p>
+          <a:p>
+            <a:r>
+              <a:rPr lang="en-US" dirty="0"/>
+              <a:t>At its heart, clustering is an unsupervised problem</a:t>
+            </a:r>
+          </a:p>
+          <a:p>
+            <a:pPr lvl="1"/>
+            <a:r>
+              <a:rPr lang="en-US" dirty="0"/>
+              <a:t>Need to collect data for more subreddits and perform truly unsupervised clustering</a:t>
+            </a:r>
+          </a:p>
+        </p:txBody>
+      </p:sp>
+      <p:sp>
+        <p:nvSpPr>
+          <p:cNvPr id="4" name="Slide Number Placeholder 3">
+            <a:extLst>
+              <a:ext uri="{FF2B5EF4-FFF2-40B4-BE49-F238E27FC236}">
+                <a16:creationId xmlns:a16="http://schemas.microsoft.com/office/drawing/2014/main" id="{472E3D20-EB19-4227-BBA2-F550946CC938}"/>
+              </a:ext>
+            </a:extLst>
+          </p:cNvPr>
+          <p:cNvSpPr>
+            <a:spLocks noGrp="1"/>
+          </p:cNvSpPr>
+          <p:nvPr>
+            <p:ph type="sldNum" idx="12"/>
+          </p:nvPr>
+        </p:nvSpPr>
+        <p:spPr/>
+        <p:txBody>
+          <a:bodyPr/>
+          <a:lstStyle/>
+          <a:p>
+            <a:pPr marL="0" lvl="0" indent="0" algn="r" rtl="0">
+              <a:spcBef>
+                <a:spcPts val="0"/>
+              </a:spcBef>
+              <a:spcAft>
+                <a:spcPts val="0"/>
+              </a:spcAft>
+              <a:buNone/>
+            </a:pPr>
+            <a:fld id="{00000000-1234-1234-1234-123412341234}" type="slidenum">
+              <a:rPr lang="en" smtClean="0"/>
+              <a:t>53</a:t>
+            </a:fld>
+            <a:endParaRPr lang="en"/>
+          </a:p>
+        </p:txBody>
+      </p:sp>
+    </p:spTree>
+    <p:extLst>
+      <p:ext uri="{BB962C8B-B14F-4D97-AF65-F5344CB8AC3E}">
+        <p14:creationId xmlns:p14="http://schemas.microsoft.com/office/powerpoint/2010/main" val="564110824"/>
+      </p:ext>
+    </p:extLst>
+  </p:cSld>
+  <p:clrMapOvr>
+    <a:masterClrMapping/>
+  </p:clrMapOvr>
+</p:sld>
+</file>
+
+<file path=ppt/slides/slide54.xml><?xml version="1.0" encoding="utf-8"?>
+<p:sld xmlns:a="http://schemas.openxmlformats.org/drawingml/2006/main" xmlns:r="http://schemas.openxmlformats.org/officeDocument/2006/relationships" xmlns:p="http://schemas.openxmlformats.org/presentationml/2006/main">
+  <p:cSld>
+    <p:spTree>
+      <p:nvGrpSpPr>
+        <p:cNvPr id="1" name=""/>
+        <p:cNvGrpSpPr/>
+        <p:nvPr/>
+      </p:nvGrpSpPr>
+      <p:grpSpPr>
+        <a:xfrm>
+          <a:off x="0" y="0"/>
+          <a:ext cx="0" cy="0"/>
+          <a:chOff x="0" y="0"/>
+          <a:chExt cx="0" cy="0"/>
+        </a:xfrm>
+      </p:grpSpPr>
+      <p:sp>
+        <p:nvSpPr>
+          <p:cNvPr id="2" name="Title 1">
+            <a:extLst>
+              <a:ext uri="{FF2B5EF4-FFF2-40B4-BE49-F238E27FC236}">
+                <a16:creationId xmlns:a16="http://schemas.microsoft.com/office/drawing/2014/main" id="{9258B22A-CFC8-4DA5-9820-DDBE59F2D7F4}"/>
+              </a:ext>
+            </a:extLst>
+          </p:cNvPr>
+          <p:cNvSpPr>
+            <a:spLocks noGrp="1"/>
+          </p:cNvSpPr>
+          <p:nvPr>
+            <p:ph type="title"/>
+          </p:nvPr>
+        </p:nvSpPr>
+        <p:spPr>
+          <a:xfrm>
+            <a:off x="0" y="2223600"/>
+            <a:ext cx="9144000" cy="696300"/>
+          </a:xfrm>
+        </p:spPr>
+        <p:txBody>
+          <a:bodyPr/>
+          <a:lstStyle/>
+          <a:p>
+            <a:r>
+              <a:rPr lang="en-US" sz="5000" dirty="0"/>
+              <a:t>Questions?</a:t>
+            </a:r>
+          </a:p>
+        </p:txBody>
+      </p:sp>
+      <p:sp>
+        <p:nvSpPr>
+          <p:cNvPr id="3" name="Slide Number Placeholder 2">
+            <a:extLst>
+              <a:ext uri="{FF2B5EF4-FFF2-40B4-BE49-F238E27FC236}">
+                <a16:creationId xmlns:a16="http://schemas.microsoft.com/office/drawing/2014/main" id="{1E38700F-C990-45CF-8B0E-4AE13EE85E04}"/>
+              </a:ext>
+            </a:extLst>
+          </p:cNvPr>
+          <p:cNvSpPr>
+            <a:spLocks noGrp="1"/>
+          </p:cNvSpPr>
+          <p:nvPr>
+            <p:ph type="sldNum" idx="12"/>
+          </p:nvPr>
+        </p:nvSpPr>
+        <p:spPr/>
+        <p:txBody>
+          <a:bodyPr/>
+          <a:lstStyle/>
+          <a:p>
+            <a:pPr marL="0" lvl="0" indent="0" algn="r" rtl="0">
+              <a:spcBef>
+                <a:spcPts val="0"/>
+              </a:spcBef>
+              <a:spcAft>
+                <a:spcPts val="0"/>
+              </a:spcAft>
+              <a:buNone/>
+            </a:pPr>
+            <a:fld id="{00000000-1234-1234-1234-123412341234}" type="slidenum">
+              <a:rPr lang="en" smtClean="0"/>
+              <a:t>54</a:t>
+            </a:fld>
+            <a:endParaRPr lang="en"/>
+          </a:p>
+        </p:txBody>
+      </p:sp>
+    </p:spTree>
+    <p:extLst>
+      <p:ext uri="{BB962C8B-B14F-4D97-AF65-F5344CB8AC3E}">
+        <p14:creationId xmlns:p14="http://schemas.microsoft.com/office/powerpoint/2010/main" val="611486635"/>
       </p:ext>
     </p:extLst>
   </p:cSld>

</xml_diff>